<commit_message>
added server code zip
</commit_message>
<xml_diff>
--- a/softwareProjectFinal.pptx
+++ b/softwareProjectFinal.pptx
@@ -327,7 +327,7 @@
             <a:pPr algn="r">
               <a:buNone/>
             </a:pPr>
-            <a:fld id="{AB0E26F7-9BF9-4897-A3AE-04F9A0A49F35}" type="slidenum">
+            <a:fld id="{1FA8E268-E14C-466F-9E5F-6D49416A99DC}" type="slidenum">
               <a:rPr b="0" lang="en-US" sz="1400" spc="-1" strike="noStrike">
                 <a:latin typeface="Times New Roman"/>
               </a:rPr>
@@ -375,7 +375,7 @@
         <p:spPr>
           <a:xfrm>
             <a:off x="990720" y="766800"/>
-            <a:ext cx="5114160" cy="3834720"/>
+            <a:ext cx="5113440" cy="3834000"/>
           </a:xfrm>
           <a:prstGeom prst="rect">
             <a:avLst/>
@@ -398,7 +398,7 @@
         <p:spPr>
           <a:xfrm>
             <a:off x="709560" y="4862520"/>
-            <a:ext cx="5676120" cy="4601520"/>
+            <a:ext cx="5675400" cy="4600800"/>
           </a:xfrm>
           <a:prstGeom prst="rect">
             <a:avLst/>
@@ -409,7 +409,7 @@
           </a:ln>
         </p:spPr>
         <p:txBody>
-          <a:bodyPr numCol="1" spcCol="0" anchor="t">
+          <a:bodyPr numCol="1" spcCol="0" lIns="0" rIns="0" tIns="0" bIns="0" anchor="t">
             <a:noAutofit/>
           </a:bodyPr>
           <a:p>
@@ -432,7 +432,7 @@
         <p:spPr>
           <a:xfrm>
             <a:off x="4021200" y="9720360"/>
-            <a:ext cx="3072600" cy="508680"/>
+            <a:ext cx="3071880" cy="507960"/>
           </a:xfrm>
           <a:prstGeom prst="rect">
             <a:avLst/>
@@ -443,7 +443,7 @@
           </a:ln>
         </p:spPr>
         <p:txBody>
-          <a:bodyPr numCol="1" spcCol="0" anchor="b">
+          <a:bodyPr numCol="1" spcCol="0" lIns="0" rIns="0" tIns="0" bIns="0" anchor="b">
             <a:noAutofit/>
           </a:bodyPr>
           <a:lstStyle>
@@ -473,7 +473,7 @@
                 <a:tab algn="l" pos="0"/>
               </a:tabLst>
             </a:pPr>
-            <a:fld id="{9AD47DBE-EE2F-4F3C-822C-EA75A108F536}" type="slidenum">
+            <a:fld id="{3404C6F9-E59D-4D9D-ACB8-6EAEF9F4F5FD}" type="slidenum">
               <a:rPr b="0" lang="en-US" sz="1100" spc="-1" strike="noStrike">
                 <a:solidFill>
                   <a:srgbClr val="000000"/>
@@ -544,7 +544,7 @@
         <p:txBody>
           <a:bodyPr/>
           <a:p>
-            <a:fld id="{2F90E878-4414-4D78-B444-9DB4DC299735}" type="slidenum">
+            <a:fld id="{0AA1F899-8EEC-41B1-9DD3-AE9A7F4693C1}" type="slidenum">
               <a:t>&lt;#&gt;</a:t>
             </a:fld>
           </a:p>
@@ -606,7 +606,7 @@
         <p:spPr>
           <a:xfrm>
             <a:off x="457200" y="274680"/>
-            <a:ext cx="8225640" cy="1139040"/>
+            <a:ext cx="8224920" cy="1138320"/>
           </a:xfrm>
           <a:prstGeom prst="rect">
             <a:avLst/>
@@ -643,7 +643,7 @@
         <p:spPr>
           <a:xfrm>
             <a:off x="457200" y="1604520"/>
-            <a:ext cx="11880" cy="1800"/>
+            <a:ext cx="2160" cy="360"/>
           </a:xfrm>
           <a:prstGeom prst="rect">
             <a:avLst/>
@@ -676,8 +676,8 @@
         </p:nvSpPr>
         <p:spPr>
           <a:xfrm>
-            <a:off x="457200" y="1607040"/>
-            <a:ext cx="11880" cy="1800"/>
+            <a:off x="457200" y="1604880"/>
+            <a:ext cx="2160" cy="360"/>
           </a:xfrm>
           <a:prstGeom prst="rect">
             <a:avLst/>
@@ -732,7 +732,7 @@
         <p:txBody>
           <a:bodyPr/>
           <a:p>
-            <a:fld id="{4F1DF9FA-2AC6-4119-AE16-E6ED40CA190F}" type="slidenum">
+            <a:fld id="{7EC10F51-DA4F-4359-BE1A-945B5F36976F}" type="slidenum">
               <a:t>&lt;#&gt;</a:t>
             </a:fld>
           </a:p>
@@ -794,7 +794,7 @@
         <p:spPr>
           <a:xfrm>
             <a:off x="457200" y="274680"/>
-            <a:ext cx="8225640" cy="1139040"/>
+            <a:ext cx="8224920" cy="1138320"/>
           </a:xfrm>
           <a:prstGeom prst="rect">
             <a:avLst/>
@@ -831,7 +831,7 @@
         <p:spPr>
           <a:xfrm>
             <a:off x="457200" y="1604520"/>
-            <a:ext cx="5760" cy="1800"/>
+            <a:ext cx="720" cy="360"/>
           </a:xfrm>
           <a:prstGeom prst="rect">
             <a:avLst/>
@@ -864,8 +864,8 @@
         </p:nvSpPr>
         <p:spPr>
           <a:xfrm>
-            <a:off x="463680" y="1604520"/>
-            <a:ext cx="5760" cy="1800"/>
+            <a:off x="458280" y="1604520"/>
+            <a:ext cx="720" cy="360"/>
           </a:xfrm>
           <a:prstGeom prst="rect">
             <a:avLst/>
@@ -898,8 +898,8 @@
         </p:nvSpPr>
         <p:spPr>
           <a:xfrm>
-            <a:off x="457200" y="1607040"/>
-            <a:ext cx="5760" cy="1800"/>
+            <a:off x="457200" y="1604880"/>
+            <a:ext cx="720" cy="360"/>
           </a:xfrm>
           <a:prstGeom prst="rect">
             <a:avLst/>
@@ -932,8 +932,8 @@
         </p:nvSpPr>
         <p:spPr>
           <a:xfrm>
-            <a:off x="463680" y="1607040"/>
-            <a:ext cx="5760" cy="1800"/>
+            <a:off x="458280" y="1604880"/>
+            <a:ext cx="720" cy="360"/>
           </a:xfrm>
           <a:prstGeom prst="rect">
             <a:avLst/>
@@ -988,7 +988,7 @@
         <p:txBody>
           <a:bodyPr/>
           <a:p>
-            <a:fld id="{561554B2-9214-4418-96F4-EFEA5CCA1C39}" type="slidenum">
+            <a:fld id="{D7BC0156-220B-4274-B583-D45B7BA9AD16}" type="slidenum">
               <a:t>&lt;#&gt;</a:t>
             </a:fld>
           </a:p>
@@ -1050,7 +1050,7 @@
         <p:spPr>
           <a:xfrm>
             <a:off x="457200" y="274680"/>
-            <a:ext cx="8225640" cy="1139040"/>
+            <a:ext cx="8224920" cy="1138320"/>
           </a:xfrm>
           <a:prstGeom prst="rect">
             <a:avLst/>
@@ -1087,7 +1087,7 @@
         <p:spPr>
           <a:xfrm>
             <a:off x="457200" y="1604520"/>
-            <a:ext cx="3600" cy="1800"/>
+            <a:ext cx="360" cy="360"/>
           </a:xfrm>
           <a:prstGeom prst="rect">
             <a:avLst/>
@@ -1120,8 +1120,8 @@
         </p:nvSpPr>
         <p:spPr>
           <a:xfrm>
-            <a:off x="461520" y="1604520"/>
-            <a:ext cx="3600" cy="1800"/>
+            <a:off x="457920" y="1604520"/>
+            <a:ext cx="360" cy="360"/>
           </a:xfrm>
           <a:prstGeom prst="rect">
             <a:avLst/>
@@ -1154,8 +1154,8 @@
         </p:nvSpPr>
         <p:spPr>
           <a:xfrm>
-            <a:off x="465480" y="1604520"/>
-            <a:ext cx="3600" cy="1800"/>
+            <a:off x="458640" y="1604520"/>
+            <a:ext cx="360" cy="360"/>
           </a:xfrm>
           <a:prstGeom prst="rect">
             <a:avLst/>
@@ -1188,8 +1188,8 @@
         </p:nvSpPr>
         <p:spPr>
           <a:xfrm>
-            <a:off x="457200" y="1607040"/>
-            <a:ext cx="3600" cy="1800"/>
+            <a:off x="457200" y="1604880"/>
+            <a:ext cx="360" cy="360"/>
           </a:xfrm>
           <a:prstGeom prst="rect">
             <a:avLst/>
@@ -1222,8 +1222,8 @@
         </p:nvSpPr>
         <p:spPr>
           <a:xfrm>
-            <a:off x="461520" y="1607040"/>
-            <a:ext cx="3600" cy="1800"/>
+            <a:off x="457920" y="1604880"/>
+            <a:ext cx="360" cy="360"/>
           </a:xfrm>
           <a:prstGeom prst="rect">
             <a:avLst/>
@@ -1256,8 +1256,8 @@
         </p:nvSpPr>
         <p:spPr>
           <a:xfrm>
-            <a:off x="465480" y="1607040"/>
-            <a:ext cx="3600" cy="1800"/>
+            <a:off x="458640" y="1604880"/>
+            <a:ext cx="360" cy="360"/>
           </a:xfrm>
           <a:prstGeom prst="rect">
             <a:avLst/>
@@ -1312,7 +1312,7 @@
         <p:txBody>
           <a:bodyPr/>
           <a:p>
-            <a:fld id="{A463E08E-D071-4BC2-95F4-53536357401F}" type="slidenum">
+            <a:fld id="{2F03C8A7-7DF1-44DC-9906-587108E19BEA}" type="slidenum">
               <a:t>&lt;#&gt;</a:t>
             </a:fld>
           </a:p>
@@ -1374,7 +1374,7 @@
         <p:spPr>
           <a:xfrm>
             <a:off x="457200" y="274680"/>
-            <a:ext cx="8225640" cy="1139040"/>
+            <a:ext cx="8224920" cy="1138320"/>
           </a:xfrm>
           <a:prstGeom prst="rect">
             <a:avLst/>
@@ -1410,8 +1410,8 @@
         </p:nvSpPr>
         <p:spPr>
           <a:xfrm>
-            <a:off x="457200" y="-2267640"/>
-            <a:ext cx="11880" cy="7748280"/>
+            <a:off x="457200" y="-2269440"/>
+            <a:ext cx="2160" cy="7748280"/>
           </a:xfrm>
           <a:prstGeom prst="rect">
             <a:avLst/>
@@ -1469,7 +1469,7 @@
         <p:txBody>
           <a:bodyPr/>
           <a:p>
-            <a:fld id="{4C1DB45A-BEC2-4A58-A81E-D275456CF5C5}" type="slidenum">
+            <a:fld id="{430FBE22-FCA3-43AC-B9B7-D1341AA9E829}" type="slidenum">
               <a:t>&lt;#&gt;</a:t>
             </a:fld>
           </a:p>
@@ -1531,7 +1531,7 @@
         <p:spPr>
           <a:xfrm>
             <a:off x="457200" y="274680"/>
-            <a:ext cx="8225640" cy="1139040"/>
+            <a:ext cx="8224920" cy="1138320"/>
           </a:xfrm>
           <a:prstGeom prst="rect">
             <a:avLst/>
@@ -1568,7 +1568,7 @@
         <p:spPr>
           <a:xfrm>
             <a:off x="457200" y="1604520"/>
-            <a:ext cx="11880" cy="3960"/>
+            <a:ext cx="2160" cy="360"/>
           </a:xfrm>
           <a:prstGeom prst="rect">
             <a:avLst/>
@@ -1623,7 +1623,7 @@
         <p:txBody>
           <a:bodyPr/>
           <a:p>
-            <a:fld id="{DB0B75A8-F12A-4E3D-9BF7-976BB6A50AFF}" type="slidenum">
+            <a:fld id="{276D0F56-1521-46AF-AC12-C72D5B340631}" type="slidenum">
               <a:t>&lt;#&gt;</a:t>
             </a:fld>
           </a:p>
@@ -1685,7 +1685,7 @@
         <p:spPr>
           <a:xfrm>
             <a:off x="457200" y="274680"/>
-            <a:ext cx="8225640" cy="1139040"/>
+            <a:ext cx="8224920" cy="1138320"/>
           </a:xfrm>
           <a:prstGeom prst="rect">
             <a:avLst/>
@@ -1722,7 +1722,7 @@
         <p:spPr>
           <a:xfrm>
             <a:off x="457200" y="1604520"/>
-            <a:ext cx="5760" cy="3960"/>
+            <a:ext cx="720" cy="360"/>
           </a:xfrm>
           <a:prstGeom prst="rect">
             <a:avLst/>
@@ -1755,8 +1755,8 @@
         </p:nvSpPr>
         <p:spPr>
           <a:xfrm>
-            <a:off x="463680" y="1604520"/>
-            <a:ext cx="5760" cy="3960"/>
+            <a:off x="458280" y="1604520"/>
+            <a:ext cx="720" cy="360"/>
           </a:xfrm>
           <a:prstGeom prst="rect">
             <a:avLst/>
@@ -1811,7 +1811,7 @@
         <p:txBody>
           <a:bodyPr/>
           <a:p>
-            <a:fld id="{0C1F2FCF-4439-4057-BC3F-E6254D910967}" type="slidenum">
+            <a:fld id="{E62349D5-4502-458D-85D7-6FCD042123B1}" type="slidenum">
               <a:t>&lt;#&gt;</a:t>
             </a:fld>
           </a:p>
@@ -1873,7 +1873,7 @@
         <p:spPr>
           <a:xfrm>
             <a:off x="457200" y="274680"/>
-            <a:ext cx="8225640" cy="1139040"/>
+            <a:ext cx="8224920" cy="1138320"/>
           </a:xfrm>
           <a:prstGeom prst="rect">
             <a:avLst/>
@@ -1931,7 +1931,7 @@
         <p:txBody>
           <a:bodyPr/>
           <a:p>
-            <a:fld id="{E703616D-F9CF-4D4A-A21B-F39A47E4C48A}" type="slidenum">
+            <a:fld id="{08A580FC-46B7-47B7-81A5-033F629D2608}" type="slidenum">
               <a:t>&lt;#&gt;</a:t>
             </a:fld>
           </a:p>
@@ -1993,7 +1993,7 @@
         <p:spPr>
           <a:xfrm>
             <a:off x="457200" y="274680"/>
-            <a:ext cx="8225640" cy="5281200"/>
+            <a:ext cx="8224920" cy="5277960"/>
           </a:xfrm>
           <a:prstGeom prst="rect">
             <a:avLst/>
@@ -2051,7 +2051,7 @@
         <p:txBody>
           <a:bodyPr/>
           <a:p>
-            <a:fld id="{3E9501B7-26FF-4361-8239-69CC3ABA54E2}" type="slidenum">
+            <a:fld id="{419F4B91-1632-44D6-8F5F-78927D611654}" type="slidenum">
               <a:t>&lt;#&gt;</a:t>
             </a:fld>
           </a:p>
@@ -2113,7 +2113,7 @@
         <p:spPr>
           <a:xfrm>
             <a:off x="457200" y="274680"/>
-            <a:ext cx="8225640" cy="1139040"/>
+            <a:ext cx="8224920" cy="1138320"/>
           </a:xfrm>
           <a:prstGeom prst="rect">
             <a:avLst/>
@@ -2150,7 +2150,7 @@
         <p:spPr>
           <a:xfrm>
             <a:off x="457200" y="1604520"/>
-            <a:ext cx="5760" cy="1800"/>
+            <a:ext cx="720" cy="360"/>
           </a:xfrm>
           <a:prstGeom prst="rect">
             <a:avLst/>
@@ -2183,8 +2183,8 @@
         </p:nvSpPr>
         <p:spPr>
           <a:xfrm>
-            <a:off x="463680" y="1604520"/>
-            <a:ext cx="5760" cy="3960"/>
+            <a:off x="458280" y="1604520"/>
+            <a:ext cx="720" cy="360"/>
           </a:xfrm>
           <a:prstGeom prst="rect">
             <a:avLst/>
@@ -2217,8 +2217,8 @@
         </p:nvSpPr>
         <p:spPr>
           <a:xfrm>
-            <a:off x="457200" y="1607040"/>
-            <a:ext cx="5760" cy="1800"/>
+            <a:off x="457200" y="1604880"/>
+            <a:ext cx="720" cy="360"/>
           </a:xfrm>
           <a:prstGeom prst="rect">
             <a:avLst/>
@@ -2273,7 +2273,7 @@
         <p:txBody>
           <a:bodyPr/>
           <a:p>
-            <a:fld id="{0B352CDE-3879-4100-803A-540FA95C30ED}" type="slidenum">
+            <a:fld id="{BB7A3326-7404-4614-BB70-966D83774ADA}" type="slidenum">
               <a:t>&lt;#&gt;</a:t>
             </a:fld>
           </a:p>
@@ -2335,7 +2335,7 @@
         <p:spPr>
           <a:xfrm>
             <a:off x="457200" y="274680"/>
-            <a:ext cx="8225640" cy="1139040"/>
+            <a:ext cx="8224920" cy="1138320"/>
           </a:xfrm>
           <a:prstGeom prst="rect">
             <a:avLst/>
@@ -2372,7 +2372,7 @@
         <p:spPr>
           <a:xfrm>
             <a:off x="457200" y="1604520"/>
-            <a:ext cx="5760" cy="3960"/>
+            <a:ext cx="720" cy="360"/>
           </a:xfrm>
           <a:prstGeom prst="rect">
             <a:avLst/>
@@ -2405,8 +2405,8 @@
         </p:nvSpPr>
         <p:spPr>
           <a:xfrm>
-            <a:off x="463680" y="1604520"/>
-            <a:ext cx="5760" cy="1800"/>
+            <a:off x="458280" y="1604520"/>
+            <a:ext cx="720" cy="360"/>
           </a:xfrm>
           <a:prstGeom prst="rect">
             <a:avLst/>
@@ -2439,8 +2439,8 @@
         </p:nvSpPr>
         <p:spPr>
           <a:xfrm>
-            <a:off x="463680" y="1607040"/>
-            <a:ext cx="5760" cy="1800"/>
+            <a:off x="458280" y="1604880"/>
+            <a:ext cx="720" cy="360"/>
           </a:xfrm>
           <a:prstGeom prst="rect">
             <a:avLst/>
@@ -2495,7 +2495,7 @@
         <p:txBody>
           <a:bodyPr/>
           <a:p>
-            <a:fld id="{BCE57654-8444-40C7-9474-2CD4AD1B8CA1}" type="slidenum">
+            <a:fld id="{FC5A2016-B504-4C2F-83B8-3DA687EE32D3}" type="slidenum">
               <a:t>&lt;#&gt;</a:t>
             </a:fld>
           </a:p>
@@ -2557,7 +2557,7 @@
         <p:spPr>
           <a:xfrm>
             <a:off x="457200" y="274680"/>
-            <a:ext cx="8225640" cy="1139040"/>
+            <a:ext cx="8224920" cy="1138320"/>
           </a:xfrm>
           <a:prstGeom prst="rect">
             <a:avLst/>
@@ -2594,7 +2594,7 @@
         <p:spPr>
           <a:xfrm>
             <a:off x="457200" y="1604520"/>
-            <a:ext cx="5760" cy="1800"/>
+            <a:ext cx="720" cy="360"/>
           </a:xfrm>
           <a:prstGeom prst="rect">
             <a:avLst/>
@@ -2627,8 +2627,8 @@
         </p:nvSpPr>
         <p:spPr>
           <a:xfrm>
-            <a:off x="463680" y="1604520"/>
-            <a:ext cx="5760" cy="1800"/>
+            <a:off x="458280" y="1604520"/>
+            <a:ext cx="720" cy="360"/>
           </a:xfrm>
           <a:prstGeom prst="rect">
             <a:avLst/>
@@ -2661,8 +2661,8 @@
         </p:nvSpPr>
         <p:spPr>
           <a:xfrm>
-            <a:off x="457200" y="1607040"/>
-            <a:ext cx="11880" cy="1800"/>
+            <a:off x="457200" y="1604880"/>
+            <a:ext cx="2160" cy="360"/>
           </a:xfrm>
           <a:prstGeom prst="rect">
             <a:avLst/>
@@ -2717,7 +2717,7 @@
         <p:txBody>
           <a:bodyPr/>
           <a:p>
-            <a:fld id="{85B40AC3-0EF4-4795-B469-858E1E496388}" type="slidenum">
+            <a:fld id="{BE4485C1-E69F-4113-9050-DA97306C28CD}" type="slidenum">
               <a:t>&lt;#&gt;</a:t>
             </a:fld>
           </a:p>
@@ -2786,7 +2786,7 @@
         <p:spPr>
           <a:xfrm>
             <a:off x="457200" y="274680"/>
-            <a:ext cx="8225640" cy="1139040"/>
+            <a:ext cx="8224920" cy="1138320"/>
           </a:xfrm>
           <a:prstGeom prst="rect">
             <a:avLst/>
@@ -2805,13 +2805,7 @@
               <a:rPr b="0" lang="en-US" sz="1800" spc="-1" strike="noStrike">
                 <a:latin typeface="Arial"/>
               </a:rPr>
-              <a:t>Click to edit the </a:t>
-            </a:r>
-            <a:r>
-              <a:rPr b="0" lang="en-US" sz="1800" spc="-1" strike="noStrike">
-                <a:latin typeface="Arial"/>
-              </a:rPr>
-              <a:t>title text format</a:t>
+              <a:t>Click to edit the title text format</a:t>
             </a:r>
             <a:endParaRPr b="0" lang="en-US" sz="1800" spc="-1" strike="noStrike">
               <a:latin typeface="Arial"/>
@@ -2832,7 +2826,7 @@
         <p:spPr>
           <a:xfrm>
             <a:off x="457200" y="1604520"/>
-            <a:ext cx="11880" cy="3960"/>
+            <a:ext cx="2160" cy="360"/>
           </a:xfrm>
           <a:prstGeom prst="rect">
             <a:avLst/>
@@ -2994,13 +2988,7 @@
               <a:rPr b="0" lang="en-US" sz="1800" spc="-1" strike="noStrike">
                 <a:latin typeface="Arial"/>
               </a:rPr>
-              <a:t>Seventh Outline </a:t>
-            </a:r>
-            <a:r>
-              <a:rPr b="0" lang="en-US" sz="1800" spc="-1" strike="noStrike">
-                <a:latin typeface="Arial"/>
-              </a:rPr>
-              <a:t>Level</a:t>
+              <a:t>Seventh Outline Level</a:t>
             </a:r>
             <a:endParaRPr b="0" lang="en-US" sz="1800" spc="-1" strike="noStrike">
               <a:latin typeface="Arial"/>
@@ -3020,8 +3008,8 @@
         </p:nvSpPr>
         <p:spPr>
           <a:xfrm>
-            <a:off x="470520" y="1604520"/>
-            <a:ext cx="11880" cy="3960"/>
+            <a:off x="460080" y="1604520"/>
+            <a:ext cx="2160" cy="360"/>
           </a:xfrm>
           <a:prstGeom prst="rect">
             <a:avLst/>
@@ -3203,8 +3191,8 @@
         </p:nvSpPr>
         <p:spPr>
           <a:xfrm>
-            <a:off x="457200" y="1609560"/>
-            <a:ext cx="25200" cy="3960"/>
+            <a:off x="457200" y="1605240"/>
+            <a:ext cx="5040" cy="360"/>
           </a:xfrm>
           <a:prstGeom prst="rect">
             <a:avLst/>
@@ -3387,7 +3375,7 @@
         <p:spPr>
           <a:xfrm>
             <a:off x="3124080" y="6356520"/>
-            <a:ext cx="2891520" cy="361080"/>
+            <a:ext cx="2890800" cy="360360"/>
           </a:xfrm>
           <a:prstGeom prst="rect">
             <a:avLst/>
@@ -3398,7 +3386,7 @@
           </a:ln>
         </p:spPr>
         <p:txBody>
-          <a:bodyPr anchor="ctr">
+          <a:bodyPr lIns="90000" rIns="90000" tIns="45000" bIns="45000" anchor="ctr">
             <a:noAutofit/>
           </a:bodyPr>
           <a:lstStyle>
@@ -3456,7 +3444,7 @@
         <p:spPr>
           <a:xfrm>
             <a:off x="6553080" y="6356520"/>
-            <a:ext cx="2129760" cy="361080"/>
+            <a:ext cx="2129040" cy="360360"/>
           </a:xfrm>
           <a:prstGeom prst="rect">
             <a:avLst/>
@@ -3467,7 +3455,7 @@
           </a:ln>
         </p:spPr>
         <p:txBody>
-          <a:bodyPr anchor="ctr">
+          <a:bodyPr lIns="90000" rIns="90000" tIns="45000" bIns="45000" anchor="ctr">
             <a:noAutofit/>
           </a:bodyPr>
           <a:lstStyle>
@@ -3497,7 +3485,7 @@
                 <a:tab algn="l" pos="0"/>
               </a:tabLst>
             </a:pPr>
-            <a:fld id="{F364FBF4-2CC9-4538-BA4C-236F44A64335}" type="slidenum">
+            <a:fld id="{84163527-5A29-4C5C-9273-B8719F081E10}" type="slidenum">
               <a:rPr b="0" lang="en-US" sz="1200" spc="-1" strike="noStrike">
                 <a:solidFill>
                   <a:srgbClr val="8b8b8b"/>
@@ -3525,7 +3513,7 @@
         <p:spPr>
           <a:xfrm>
             <a:off x="457200" y="6356520"/>
-            <a:ext cx="2129760" cy="361080"/>
+            <a:ext cx="2129040" cy="360360"/>
           </a:xfrm>
           <a:prstGeom prst="rect">
             <a:avLst/>
@@ -3536,7 +3524,7 @@
           </a:ln>
         </p:spPr>
         <p:txBody>
-          <a:bodyPr anchor="ctr">
+          <a:bodyPr lIns="90000" rIns="90000" tIns="45000" bIns="45000" anchor="ctr">
             <a:noAutofit/>
           </a:bodyPr>
           <a:lstStyle>
@@ -3609,7 +3597,7 @@
         <p:spPr>
           <a:xfrm>
             <a:off x="457200" y="1600200"/>
-            <a:ext cx="8225640" cy="4521960"/>
+            <a:ext cx="8224920" cy="4521240"/>
           </a:xfrm>
           <a:prstGeom prst="rect">
             <a:avLst/>
@@ -3620,7 +3608,7 @@
           </a:ln>
         </p:spPr>
         <p:txBody>
-          <a:bodyPr anchor="t">
+          <a:bodyPr lIns="0" rIns="0" tIns="0" bIns="0" anchor="t">
             <a:normAutofit/>
           </a:bodyPr>
           <a:p>
@@ -3817,16 +3805,7 @@
                 </a:solidFill>
                 <a:latin typeface="Times New Roman"/>
               </a:rPr>
-              <a:t>                  </a:t>
-            </a:r>
-            <a:r>
-              <a:rPr b="0" lang="en-US" sz="3200" spc="-1" strike="noStrike">
-                <a:solidFill>
-                  <a:srgbClr val="000000"/>
-                </a:solidFill>
-                <a:latin typeface="Times New Roman"/>
-              </a:rPr>
-              <a:t>Zeroth Review – 14.02.2024</a:t>
+              <a:t>                 </a:t>
             </a:r>
             <a:endParaRPr b="0" lang="en-US" sz="3200" spc="-1" strike="noStrike">
               <a:latin typeface="Arial"/>
@@ -3847,7 +3826,7 @@
         <p:spPr>
           <a:xfrm>
             <a:off x="152280" y="228600"/>
-            <a:ext cx="3577320" cy="1152720"/>
+            <a:ext cx="3576600" cy="1152000"/>
           </a:xfrm>
           <a:prstGeom prst="rect">
             <a:avLst/>
@@ -3900,7 +3879,7 @@
         <p:spPr>
           <a:xfrm>
             <a:off x="457200" y="274680"/>
-            <a:ext cx="8225640" cy="1139040"/>
+            <a:ext cx="8224920" cy="1138320"/>
           </a:xfrm>
           <a:prstGeom prst="rect">
             <a:avLst/>
@@ -3911,11 +3890,14 @@
           </a:ln>
         </p:spPr>
         <p:txBody>
-          <a:bodyPr anchor="ctr">
+          <a:bodyPr lIns="0" rIns="0" tIns="0" bIns="0" anchor="ctr">
             <a:noAutofit/>
           </a:bodyPr>
           <a:p>
             <a:pPr algn="ctr">
+              <a:lnSpc>
+                <a:spcPct val="100000"/>
+              </a:lnSpc>
               <a:buNone/>
             </a:pPr>
             <a:r>
@@ -3934,19 +3916,7 @@
               <a:rPr b="0" lang="en-US" sz="4000" spc="-1" strike="noStrike">
                 <a:latin typeface="Arial"/>
               </a:rPr>
-              <a:t>Block </a:t>
-            </a:r>
-            <a:r>
-              <a:rPr b="0" lang="en-US" sz="4000" spc="-1" strike="noStrike">
-                <a:latin typeface="Arial"/>
-              </a:rPr>
-              <a:t>Diagra</a:t>
-            </a:r>
-            <a:r>
-              <a:rPr b="0" lang="en-US" sz="4000" spc="-1" strike="noStrike">
-                <a:latin typeface="Arial"/>
-              </a:rPr>
-              <a:t>m</a:t>
+              <a:t>Block Diagram</a:t>
             </a:r>
             <a:endParaRPr b="0" lang="en-US" sz="4000" spc="-1" strike="noStrike">
               <a:latin typeface="Arial"/>
@@ -3963,7 +3933,7 @@
         <p:spPr>
           <a:xfrm>
             <a:off x="609480" y="288000"/>
-            <a:ext cx="9140040" cy="453240"/>
+            <a:ext cx="9139320" cy="452520"/>
           </a:xfrm>
           <a:prstGeom prst="rect">
             <a:avLst/>
@@ -3989,7 +3959,7 @@
         <p:spPr>
           <a:xfrm>
             <a:off x="152280" y="152280"/>
-            <a:ext cx="9140040" cy="453240"/>
+            <a:ext cx="9139320" cy="452520"/>
           </a:xfrm>
           <a:prstGeom prst="rect">
             <a:avLst/>
@@ -4015,7 +3985,7 @@
         <p:spPr>
           <a:xfrm>
             <a:off x="762120" y="1139040"/>
-            <a:ext cx="10672200" cy="579600"/>
+            <a:ext cx="10671480" cy="578880"/>
           </a:xfrm>
           <a:prstGeom prst="rect">
             <a:avLst/>
@@ -4045,7 +4015,7 @@
         <p:spPr>
           <a:xfrm>
             <a:off x="180000" y="1913040"/>
-            <a:ext cx="8963280" cy="4944600"/>
+            <a:ext cx="8962560" cy="4943880"/>
           </a:xfrm>
           <a:prstGeom prst="rect">
             <a:avLst/>
@@ -4068,7 +4038,7 @@
         <p:spPr>
           <a:xfrm>
             <a:off x="222480" y="720000"/>
-            <a:ext cx="2117160" cy="1685520"/>
+            <a:ext cx="2116440" cy="1684800"/>
           </a:xfrm>
           <a:prstGeom prst="rect">
             <a:avLst/>
@@ -4121,7 +4091,7 @@
         <p:spPr>
           <a:xfrm>
             <a:off x="457200" y="274680"/>
-            <a:ext cx="8225640" cy="1139040"/>
+            <a:ext cx="8224920" cy="1138320"/>
           </a:xfrm>
           <a:prstGeom prst="rect">
             <a:avLst/>
@@ -4132,7 +4102,7 @@
           </a:ln>
         </p:spPr>
         <p:txBody>
-          <a:bodyPr anchor="ctr">
+          <a:bodyPr lIns="0" rIns="0" tIns="0" bIns="0" anchor="ctr">
             <a:normAutofit/>
           </a:bodyPr>
           <a:p>
@@ -4173,7 +4143,7 @@
         <p:spPr>
           <a:xfrm>
             <a:off x="360000" y="1372320"/>
-            <a:ext cx="8225640" cy="5284080"/>
+            <a:ext cx="8224920" cy="5283360"/>
           </a:xfrm>
           <a:prstGeom prst="rect">
             <a:avLst/>
@@ -4184,7 +4154,7 @@
           </a:ln>
         </p:spPr>
         <p:txBody>
-          <a:bodyPr anchor="t">
+          <a:bodyPr lIns="0" rIns="0" tIns="0" bIns="0" anchor="t">
             <a:normAutofit/>
           </a:bodyPr>
           <a:p>
@@ -4482,7 +4452,7 @@
         <p:spPr>
           <a:xfrm>
             <a:off x="457200" y="274680"/>
-            <a:ext cx="8225640" cy="1139040"/>
+            <a:ext cx="8224920" cy="1138320"/>
           </a:xfrm>
           <a:prstGeom prst="rect">
             <a:avLst/>
@@ -4493,7 +4463,7 @@
           </a:ln>
         </p:spPr>
         <p:txBody>
-          <a:bodyPr anchor="ctr">
+          <a:bodyPr lIns="0" rIns="0" tIns="0" bIns="0" anchor="ctr">
             <a:noAutofit/>
           </a:bodyPr>
           <a:p>
@@ -4534,7 +4504,7 @@
         <p:spPr>
           <a:xfrm>
             <a:off x="457200" y="1600200"/>
-            <a:ext cx="8225640" cy="4521960"/>
+            <a:ext cx="8224920" cy="4521240"/>
           </a:xfrm>
           <a:prstGeom prst="rect">
             <a:avLst/>
@@ -4545,85 +4515,125 @@
           </a:ln>
         </p:spPr>
         <p:txBody>
-          <a:bodyPr anchor="t">
+          <a:bodyPr lIns="0" rIns="0" tIns="0" bIns="0" anchor="t">
             <a:noAutofit/>
           </a:bodyPr>
           <a:p>
-            <a:pPr marL="343080">
+            <a:pPr marL="432000" indent="-324000">
               <a:lnSpc>
                 <a:spcPct val="100000"/>
               </a:lnSpc>
               <a:spcBef>
-                <a:spcPts val="641"/>
+                <a:spcPts val="1417"/>
               </a:spcBef>
-              <a:buNone/>
-              <a:tabLst>
-                <a:tab algn="l" pos="0"/>
-              </a:tabLst>
-            </a:pPr>
-            <a:endParaRPr b="0" lang="en-US" sz="3200" spc="-1" strike="noStrike">
-              <a:latin typeface="Arial"/>
-            </a:endParaRPr>
-          </a:p>
-          <a:p>
-            <a:pPr marL="343080" indent="-343080">
+              <a:buClr>
+                <a:srgbClr val="000000"/>
+              </a:buClr>
+              <a:buSzPct val="45000"/>
+              <a:buFont typeface="Wingdings" charset="2"/>
+              <a:buChar char=""/>
+            </a:pPr>
+            <a:r>
+              <a:rPr b="0" lang="en-US" sz="1800" spc="-1" strike="noStrike">
+                <a:latin typeface="Arial"/>
+              </a:rPr>
+              <a:t>T. Thapliyal, S. Bhatt, V. Rawat and S. Maurya, "Automatic License Plate Recognition (ALPR) using YOLOv5 model and Tesseract OCR engine," </a:t>
+            </a:r>
+            <a:r>
+              <a:rPr b="0" i="1" lang="en-US" sz="1800" spc="-1" strike="noStrike">
+                <a:latin typeface="Arial"/>
+              </a:rPr>
+              <a:t>2023 First International Conference on Advances in Electrical, Electronics and Computational Intelligence (ICAEECI), Tiruchengode, India</a:t>
+            </a:r>
+            <a:r>
+              <a:rPr b="0" lang="en-US" sz="1800" spc="-1" strike="noStrike">
+                <a:latin typeface="Arial"/>
+              </a:rPr>
+              <a:t>, </a:t>
+            </a:r>
+            <a:r>
+              <a:rPr b="0" i="1" lang="en-US" sz="1800" spc="-1" strike="noStrike">
+                <a:latin typeface="Arial"/>
+              </a:rPr>
+              <a:t>2023</a:t>
+            </a:r>
+            <a:endParaRPr b="0" lang="en-US" sz="1800" spc="-1" strike="noStrike">
+              <a:latin typeface="Arial"/>
+            </a:endParaRPr>
+          </a:p>
+          <a:p>
+            <a:pPr marL="432000" indent="-324000">
               <a:lnSpc>
                 <a:spcPct val="100000"/>
               </a:lnSpc>
               <a:spcBef>
-                <a:spcPts val="641"/>
+                <a:spcPts val="1417"/>
               </a:spcBef>
               <a:buClr>
                 <a:srgbClr val="000000"/>
               </a:buClr>
-              <a:buFont typeface="Arial"/>
-              <a:buChar char="•"/>
-              <a:tabLst>
-                <a:tab algn="l" pos="0"/>
-              </a:tabLst>
-            </a:pPr>
-            <a:r>
-              <a:rPr b="0" lang="en-US" sz="2100" spc="-1" strike="noStrike" u="sng">
-                <a:solidFill>
-                  <a:srgbClr val="0000ff"/>
-                </a:solidFill>
-                <a:uFillTx/>
-                <a:latin typeface="Calibri"/>
-                <a:hlinkClick r:id="rId1"/>
-              </a:rPr>
-              <a:t>https://www.mdpi.com/2076-3417/13/14/8121</a:t>
-            </a:r>
-            <a:endParaRPr b="0" lang="en-US" sz="2100" spc="-1" strike="noStrike">
-              <a:latin typeface="Arial"/>
-            </a:endParaRPr>
-          </a:p>
-          <a:p>
-            <a:pPr marL="343080" indent="-343080">
+              <a:buSzPct val="45000"/>
+              <a:buFont typeface="Wingdings" charset="2"/>
+              <a:buChar char=""/>
+            </a:pPr>
+            <a:r>
+              <a:rPr b="0" lang="en-US" sz="1800" spc="-1" strike="noStrike">
+                <a:latin typeface="Arial"/>
+              </a:rPr>
+              <a:t>H. Fakhrurroja, D. Pramesti, A. R. Hidayatullah, A. A. Fashihullisan, H. Bangkit and N. Ismail, "Automated License Plate Detection and Recognition using YOLOv8 and OCR With Tello Drone Camera,"</a:t>
+            </a:r>
+            <a:r>
+              <a:rPr b="0" i="1" lang="en-US" sz="1800" spc="-1" strike="noStrike">
+                <a:latin typeface="Arial"/>
+              </a:rPr>
+              <a:t> 2023 International Conference on Computer, Control, Informatics and its Applications (IC3INA), Bandung, Indonesia, 2023, pp. 206-211, doi: 10.1109/IC3INA60834.2023.10285750</a:t>
+            </a:r>
+            <a:endParaRPr b="0" lang="en-US" sz="1800" spc="-1" strike="noStrike">
+              <a:latin typeface="Arial"/>
+            </a:endParaRPr>
+          </a:p>
+          <a:p>
+            <a:pPr marL="432000" indent="-324000">
               <a:lnSpc>
                 <a:spcPct val="100000"/>
               </a:lnSpc>
               <a:spcBef>
-                <a:spcPts val="641"/>
+                <a:spcPts val="1417"/>
               </a:spcBef>
               <a:buClr>
                 <a:srgbClr val="000000"/>
               </a:buClr>
-              <a:buFont typeface="Arial"/>
-              <a:buChar char="•"/>
-              <a:tabLst>
-                <a:tab algn="l" pos="0"/>
-              </a:tabLst>
-            </a:pPr>
-            <a:r>
-              <a:rPr b="0" lang="en-US" sz="2100" spc="-1" strike="noStrike">
-                <a:solidFill>
-                  <a:srgbClr val="000000"/>
-                </a:solidFill>
-                <a:latin typeface="Calibri"/>
-              </a:rPr>
-              <a:t>https://ieeexplore.ieee.org/abstract/document/8481708</a:t>
-            </a:r>
-            <a:endParaRPr b="0" lang="en-US" sz="2100" spc="-1" strike="noStrike">
+              <a:buSzPct val="45000"/>
+              <a:buFont typeface="Wingdings" charset="2"/>
+              <a:buChar char=""/>
+            </a:pPr>
+            <a:r>
+              <a:rPr b="0" lang="en-US" sz="1800" spc="-1" strike="noStrike">
+                <a:latin typeface="Arial"/>
+              </a:rPr>
+              <a:t>G. Kaur, A. K. Jaiswal, R. Kumar and K. Thakur, "Automatic License Plate Recognition System,"</a:t>
+            </a:r>
+            <a:r>
+              <a:rPr b="0" i="1" lang="en-US" sz="1800" spc="-1" strike="noStrike">
+                <a:latin typeface="Arial"/>
+              </a:rPr>
+              <a:t> 2023 14th International Conference on Computing Communication and Networking Technologies (ICCCNT), Delhi, India, 2023, pp. 1-6, doi: 10.1109/ICCCNT56998.2023.10307008</a:t>
+            </a:r>
+            <a:endParaRPr b="0" lang="en-US" sz="1800" spc="-1" strike="noStrike">
+              <a:latin typeface="Arial"/>
+            </a:endParaRPr>
+          </a:p>
+          <a:p>
+            <a:pPr>
+              <a:lnSpc>
+                <a:spcPct val="100000"/>
+              </a:lnSpc>
+              <a:spcBef>
+                <a:spcPts val="1417"/>
+              </a:spcBef>
+              <a:buNone/>
+            </a:pPr>
+            <a:endParaRPr b="0" lang="en-US" sz="1800" spc="-1" strike="noStrike">
               <a:latin typeface="Arial"/>
             </a:endParaRPr>
           </a:p>
@@ -4672,7 +4682,7 @@
         <p:spPr>
           <a:xfrm>
             <a:off x="673200" y="1310760"/>
-            <a:ext cx="7927200" cy="2739240"/>
+            <a:ext cx="7926480" cy="2738520"/>
           </a:xfrm>
           <a:prstGeom prst="rect">
             <a:avLst/>
@@ -4683,7 +4693,7 @@
           </a:ln>
         </p:spPr>
         <p:txBody>
-          <a:bodyPr anchor="ctr">
+          <a:bodyPr lIns="0" rIns="0" tIns="0" bIns="0" anchor="ctr">
             <a:noAutofit/>
           </a:bodyPr>
           <a:p>
@@ -4703,7 +4713,43 @@
                 </a:solidFill>
                 <a:latin typeface="Times New Roman"/>
               </a:rPr>
-              <a:t>Integrated Surveillance System Using Machine Vison</a:t>
+              <a:t>Integrated </a:t>
+            </a:r>
+            <a:r>
+              <a:rPr b="1" lang="en-IN" sz="2400" spc="-1" strike="noStrike">
+                <a:solidFill>
+                  <a:srgbClr val="002060"/>
+                </a:solidFill>
+                <a:latin typeface="Times New Roman"/>
+              </a:rPr>
+              <a:t>Surveillance </a:t>
+            </a:r>
+            <a:r>
+              <a:rPr b="1" lang="en-IN" sz="2400" spc="-1" strike="noStrike">
+                <a:solidFill>
+                  <a:srgbClr val="002060"/>
+                </a:solidFill>
+                <a:latin typeface="Times New Roman"/>
+              </a:rPr>
+              <a:t>System Using </a:t>
+            </a:r>
+            <a:r>
+              <a:rPr b="1" lang="en-IN" sz="2400" spc="-1" strike="noStrike">
+                <a:solidFill>
+                  <a:srgbClr val="002060"/>
+                </a:solidFill>
+                <a:latin typeface="Times New Roman"/>
+              </a:rPr>
+              <a:t>Machine </a:t>
+            </a:r>
+            <a:r>
+              <a:rPr b="1" lang="en-IN" sz="2400" spc="-1" strike="noStrike">
+                <a:solidFill>
+                  <a:srgbClr val="002060"/>
+                </a:solidFill>
+                <a:latin typeface="Times New Roman"/>
+              </a:rPr>
+              <a:t>Vison</a:t>
             </a:r>
             <a:br>
               <a:rPr sz="2400"/>
@@ -4730,7 +4776,7 @@
         <p:spPr>
           <a:xfrm>
             <a:off x="357120" y="3857760"/>
-            <a:ext cx="5039640" cy="2608920"/>
+            <a:ext cx="5038920" cy="2608200"/>
           </a:xfrm>
           <a:prstGeom prst="rect">
             <a:avLst/>
@@ -4741,7 +4787,7 @@
           </a:ln>
         </p:spPr>
         <p:txBody>
-          <a:bodyPr anchor="t">
+          <a:bodyPr lIns="0" rIns="0" tIns="0" bIns="0" anchor="t">
             <a:normAutofit/>
           </a:bodyPr>
           <a:p>
@@ -4974,7 +5020,7 @@
         <p:spPr>
           <a:xfrm>
             <a:off x="5652000" y="4005000"/>
-            <a:ext cx="2948400" cy="2132280"/>
+            <a:ext cx="2947680" cy="2437200"/>
           </a:xfrm>
           <a:prstGeom prst="rect">
             <a:avLst/>
@@ -5007,6 +5053,7 @@
                   <a:srgbClr val="000000"/>
                 </a:solidFill>
                 <a:latin typeface="Times New Roman"/>
+                <a:ea typeface="DejaVu Sans"/>
               </a:rPr>
               <a:t>Supervisor:</a:t>
             </a:r>
@@ -5038,6 +5085,7 @@
                   <a:srgbClr val="000000"/>
                 </a:solidFill>
                 <a:latin typeface="Times New Roman"/>
+                <a:ea typeface="DejaVu Sans"/>
               </a:rPr>
               <a:t>Dr. M. Sathish</a:t>
             </a:r>
@@ -5053,14 +5101,26 @@
               <a:buNone/>
             </a:pPr>
             <a:r>
-              <a:rPr b="1" lang="en-US" sz="2000" spc="-1" strike="noStrike" baseline="33000">
+              <a:rPr b="1" lang="en-US" sz="2000" spc="-1" strike="noStrike">
                 <a:solidFill>
                   <a:srgbClr val="000000"/>
                 </a:solidFill>
                 <a:latin typeface="Times New Roman"/>
-              </a:rPr>
-              <a:t>Associate Professor, ECE</a:t>
-            </a:r>
+                <a:ea typeface="DejaVu Sans"/>
+              </a:rPr>
+              <a:t>Professor, ECE</a:t>
+            </a:r>
+            <a:endParaRPr b="0" lang="en-US" sz="2000" spc="-1" strike="noStrike">
+              <a:latin typeface="Arial"/>
+            </a:endParaRPr>
+          </a:p>
+          <a:p>
+            <a:pPr>
+              <a:lnSpc>
+                <a:spcPct val="100000"/>
+              </a:lnSpc>
+              <a:buNone/>
+            </a:pPr>
             <a:endParaRPr b="0" lang="en-US" sz="2000" spc="-1" strike="noStrike">
               <a:latin typeface="Arial"/>
             </a:endParaRPr>
@@ -5113,7 +5173,7 @@
         <p:spPr>
           <a:xfrm>
             <a:off x="0" y="0"/>
-            <a:ext cx="4068000" cy="1311120"/>
+            <a:ext cx="4067280" cy="1310400"/>
           </a:xfrm>
           <a:prstGeom prst="rect">
             <a:avLst/>
@@ -5166,7 +5226,7 @@
         <p:spPr>
           <a:xfrm>
             <a:off x="457200" y="274680"/>
-            <a:ext cx="8225640" cy="1139040"/>
+            <a:ext cx="8224920" cy="1138320"/>
           </a:xfrm>
           <a:prstGeom prst="rect">
             <a:avLst/>
@@ -5177,7 +5237,7 @@
           </a:ln>
         </p:spPr>
         <p:txBody>
-          <a:bodyPr anchor="ctr">
+          <a:bodyPr lIns="0" rIns="0" tIns="0" bIns="0" anchor="ctr">
             <a:noAutofit/>
           </a:bodyPr>
           <a:p>
@@ -5197,7 +5257,16 @@
                 </a:solidFill>
                 <a:latin typeface="Times New Roman"/>
               </a:rPr>
-              <a:t>OUTLINE</a:t>
+              <a:t>OUTLI</a:t>
+            </a:r>
+            <a:r>
+              <a:rPr b="0" lang="en-US" sz="4400" spc="-1" strike="noStrike">
+                <a:solidFill>
+                  <a:srgbClr val="000000"/>
+                </a:solidFill>
+                <a:latin typeface="Times New Roman"/>
+              </a:rPr>
+              <a:t>NE</a:t>
             </a:r>
             <a:endParaRPr b="0" lang="en-US" sz="4400" spc="-1" strike="noStrike">
               <a:latin typeface="Arial"/>
@@ -5218,7 +5287,7 @@
         <p:spPr>
           <a:xfrm>
             <a:off x="457200" y="1600200"/>
-            <a:ext cx="8225640" cy="4521960"/>
+            <a:ext cx="8224920" cy="4521240"/>
           </a:xfrm>
           <a:prstGeom prst="rect">
             <a:avLst/>
@@ -5229,8 +5298,8 @@
           </a:ln>
         </p:spPr>
         <p:txBody>
-          <a:bodyPr anchor="t">
-            <a:normAutofit fontScale="53000"/>
+          <a:bodyPr lIns="0" rIns="0" tIns="0" bIns="0" anchor="t">
+            <a:normAutofit fontScale="54000"/>
           </a:bodyPr>
           <a:p>
             <a:pPr marL="343080" indent="-343080">
@@ -5483,7 +5552,7 @@
             </a:endParaRPr>
           </a:p>
           <a:p>
-            <a:pPr marL="343080">
+            <a:pPr marL="343080" indent="-343080">
               <a:lnSpc>
                 <a:spcPct val="100000"/>
               </a:lnSpc>
@@ -5544,7 +5613,7 @@
         <p:spPr>
           <a:xfrm>
             <a:off x="457200" y="720000"/>
-            <a:ext cx="8225640" cy="779040"/>
+            <a:ext cx="8224920" cy="778320"/>
           </a:xfrm>
           <a:prstGeom prst="rect">
             <a:avLst/>
@@ -5555,8 +5624,8 @@
           </a:ln>
         </p:spPr>
         <p:txBody>
-          <a:bodyPr anchor="ctr">
-            <a:normAutofit fontScale="4000"/>
+          <a:bodyPr lIns="0" rIns="0" tIns="0" bIns="0" anchor="ctr">
+            <a:normAutofit fontScale="5000"/>
           </a:bodyPr>
           <a:p>
             <a:pPr algn="ctr">
@@ -5575,61 +5644,7 @@
                 </a:solidFill>
                 <a:latin typeface="Times New Roman"/>
               </a:rPr>
-              <a:t>A</a:t>
-            </a:r>
-            <a:r>
-              <a:rPr b="0" lang="en-IN" sz="99990" spc="-1" strike="noStrike">
-                <a:solidFill>
-                  <a:srgbClr val="000000"/>
-                </a:solidFill>
-                <a:latin typeface="Times New Roman"/>
-              </a:rPr>
-              <a:t>b</a:t>
-            </a:r>
-            <a:r>
-              <a:rPr b="0" lang="en-IN" sz="99990" spc="-1" strike="noStrike">
-                <a:solidFill>
-                  <a:srgbClr val="000000"/>
-                </a:solidFill>
-                <a:latin typeface="Times New Roman"/>
-              </a:rPr>
-              <a:t>s</a:t>
-            </a:r>
-            <a:r>
-              <a:rPr b="0" lang="en-IN" sz="99990" spc="-1" strike="noStrike">
-                <a:solidFill>
-                  <a:srgbClr val="000000"/>
-                </a:solidFill>
-                <a:latin typeface="Times New Roman"/>
-              </a:rPr>
-              <a:t>tr</a:t>
-            </a:r>
-            <a:r>
-              <a:rPr b="0" lang="en-IN" sz="99990" spc="-1" strike="noStrike">
-                <a:solidFill>
-                  <a:srgbClr val="000000"/>
-                </a:solidFill>
-                <a:latin typeface="Times New Roman"/>
-              </a:rPr>
-              <a:t>a</a:t>
-            </a:r>
-            <a:r>
-              <a:rPr b="0" lang="en-IN" sz="99990" spc="-1" strike="noStrike">
-                <a:solidFill>
-                  <a:srgbClr val="000000"/>
-                </a:solidFill>
-                <a:latin typeface="Times New Roman"/>
-              </a:rPr>
-              <a:t>c</a:t>
-            </a:r>
-            <a:r>
-              <a:rPr b="0" lang="en-IN" sz="99990" spc="-1" strike="noStrike">
-                <a:solidFill>
-                  <a:srgbClr val="000000"/>
-                </a:solidFill>
-                <a:latin typeface="Times New Roman"/>
-              </a:rPr>
-              <a:t>t</a:t>
+              <a:t>Abstract</a:t>
             </a:r>
             <a:endParaRPr b="0" lang="en-US" sz="99990" spc="-1" strike="noStrike">
               <a:latin typeface="Arial"/>
@@ -5650,7 +5665,7 @@
         <p:spPr>
           <a:xfrm>
             <a:off x="231120" y="1620000"/>
-            <a:ext cx="8225640" cy="5025240"/>
+            <a:ext cx="8224920" cy="5024520"/>
           </a:xfrm>
           <a:prstGeom prst="rect">
             <a:avLst/>
@@ -5661,7 +5676,7 @@
           </a:ln>
         </p:spPr>
         <p:txBody>
-          <a:bodyPr anchor="t">
+          <a:bodyPr lIns="0" rIns="0" tIns="0" bIns="0" anchor="t">
             <a:normAutofit/>
           </a:bodyPr>
           <a:p>
@@ -5701,7 +5716,133 @@
                 </a:solidFill>
                 <a:latin typeface="Calibri"/>
               </a:rPr>
-              <a:t>This project presents an integrated surveillace ststem leveraging advanced license plate recognition (LPR) technology. The primary objective is to develop a robust platform capable of efficiently identifying and recording vehicles based on their licence plates, thereby enhancing tracking and surveillance capabilities in various contexts. The YOLOv8 model is used for initial object segmentation followed by fine-tuning through transfer learning to specialize in license plate recognition/ An optical character recognition(OCR) model is applied to identify the license plate. The collected data, along with corresponding timestamp and the image of the vehicle is stored in a database for analysis.</a:t>
+              <a:t>This project presents an integrated surveillace </a:t>
+            </a:r>
+            <a:r>
+              <a:rPr b="0" lang="en-US" sz="3200" spc="-1" strike="noStrike" baseline="33000">
+                <a:solidFill>
+                  <a:srgbClr val="000000"/>
+                </a:solidFill>
+                <a:latin typeface="Calibri"/>
+              </a:rPr>
+              <a:t>ststem leveraging advanced license plate </a:t>
+            </a:r>
+            <a:r>
+              <a:rPr b="0" lang="en-US" sz="3200" spc="-1" strike="noStrike" baseline="33000">
+                <a:solidFill>
+                  <a:srgbClr val="000000"/>
+                </a:solidFill>
+                <a:latin typeface="Calibri"/>
+              </a:rPr>
+              <a:t>recognition (LPR) technology. The primary </a:t>
+            </a:r>
+            <a:r>
+              <a:rPr b="0" lang="en-US" sz="3200" spc="-1" strike="noStrike" baseline="33000">
+                <a:solidFill>
+                  <a:srgbClr val="000000"/>
+                </a:solidFill>
+                <a:latin typeface="Calibri"/>
+              </a:rPr>
+              <a:t>objective is to develop a robust platform </a:t>
+            </a:r>
+            <a:r>
+              <a:rPr b="0" lang="en-US" sz="3200" spc="-1" strike="noStrike" baseline="33000">
+                <a:solidFill>
+                  <a:srgbClr val="000000"/>
+                </a:solidFill>
+                <a:latin typeface="Calibri"/>
+              </a:rPr>
+              <a:t>capable of efficiently identifying and recording </a:t>
+            </a:r>
+            <a:r>
+              <a:rPr b="0" lang="en-US" sz="3200" spc="-1" strike="noStrike" baseline="33000">
+                <a:solidFill>
+                  <a:srgbClr val="000000"/>
+                </a:solidFill>
+                <a:latin typeface="Calibri"/>
+              </a:rPr>
+              <a:t>vehicles based on their licence plates, thereby </a:t>
+            </a:r>
+            <a:r>
+              <a:rPr b="0" lang="en-US" sz="3200" spc="-1" strike="noStrike" baseline="33000">
+                <a:solidFill>
+                  <a:srgbClr val="000000"/>
+                </a:solidFill>
+                <a:latin typeface="Calibri"/>
+              </a:rPr>
+              <a:t>enhancing tracking and surveillance capabilities </a:t>
+            </a:r>
+            <a:r>
+              <a:rPr b="0" lang="en-US" sz="3200" spc="-1" strike="noStrike" baseline="33000">
+                <a:solidFill>
+                  <a:srgbClr val="000000"/>
+                </a:solidFill>
+                <a:latin typeface="Calibri"/>
+              </a:rPr>
+              <a:t>in various contexts. The YOLOv8 model is used </a:t>
+            </a:r>
+            <a:r>
+              <a:rPr b="0" lang="en-US" sz="3200" spc="-1" strike="noStrike" baseline="33000">
+                <a:solidFill>
+                  <a:srgbClr val="000000"/>
+                </a:solidFill>
+                <a:latin typeface="Calibri"/>
+              </a:rPr>
+              <a:t>for initial object segmentation followed by fine-</a:t>
+            </a:r>
+            <a:r>
+              <a:rPr b="0" lang="en-US" sz="3200" spc="-1" strike="noStrike" baseline="33000">
+                <a:solidFill>
+                  <a:srgbClr val="000000"/>
+                </a:solidFill>
+                <a:latin typeface="Calibri"/>
+              </a:rPr>
+              <a:t>tuning through transfer learning to specialize in </a:t>
+            </a:r>
+            <a:r>
+              <a:rPr b="0" lang="en-US" sz="3200" spc="-1" strike="noStrike" baseline="33000">
+                <a:solidFill>
+                  <a:srgbClr val="000000"/>
+                </a:solidFill>
+                <a:latin typeface="Calibri"/>
+              </a:rPr>
+              <a:t>license plate recognition/ An optical character </a:t>
+            </a:r>
+            <a:r>
+              <a:rPr b="0" lang="en-US" sz="3200" spc="-1" strike="noStrike" baseline="33000">
+                <a:solidFill>
+                  <a:srgbClr val="000000"/>
+                </a:solidFill>
+                <a:latin typeface="Calibri"/>
+              </a:rPr>
+              <a:t>recognition(OCR) model is applied to identify </a:t>
+            </a:r>
+            <a:r>
+              <a:rPr b="0" lang="en-US" sz="3200" spc="-1" strike="noStrike" baseline="33000">
+                <a:solidFill>
+                  <a:srgbClr val="000000"/>
+                </a:solidFill>
+                <a:latin typeface="Calibri"/>
+              </a:rPr>
+              <a:t>the license plate. The collected data, along with </a:t>
+            </a:r>
+            <a:r>
+              <a:rPr b="0" lang="en-US" sz="3200" spc="-1" strike="noStrike" baseline="33000">
+                <a:solidFill>
+                  <a:srgbClr val="000000"/>
+                </a:solidFill>
+                <a:latin typeface="Calibri"/>
+              </a:rPr>
+              <a:t>corresponding timestamp and the image of the </a:t>
+            </a:r>
+            <a:r>
+              <a:rPr b="0" lang="en-US" sz="3200" spc="-1" strike="noStrike" baseline="33000">
+                <a:solidFill>
+                  <a:srgbClr val="000000"/>
+                </a:solidFill>
+                <a:latin typeface="Calibri"/>
+              </a:rPr>
+              <a:t>vehicle is stored in a database for analysis.</a:t>
             </a:r>
             <a:endParaRPr b="0" lang="en-US" sz="3200" spc="-1" strike="noStrike">
               <a:latin typeface="Arial"/>
@@ -5752,7 +5893,7 @@
         <p:spPr>
           <a:xfrm>
             <a:off x="457200" y="274680"/>
-            <a:ext cx="8225640" cy="1139040"/>
+            <a:ext cx="8224920" cy="1138320"/>
           </a:xfrm>
           <a:prstGeom prst="rect">
             <a:avLst/>
@@ -5763,7 +5904,7 @@
           </a:ln>
         </p:spPr>
         <p:txBody>
-          <a:bodyPr anchor="ctr">
+          <a:bodyPr lIns="0" rIns="0" tIns="0" bIns="0" anchor="ctr">
             <a:noAutofit/>
           </a:bodyPr>
           <a:p>
@@ -5783,16 +5924,7 @@
                 </a:solidFill>
                 <a:latin typeface="Times New Roman"/>
               </a:rPr>
-              <a:t>Objecti</a:t>
-            </a:r>
-            <a:r>
-              <a:rPr b="0" lang="en-IN" sz="4400" spc="-1" strike="noStrike">
-                <a:solidFill>
-                  <a:srgbClr val="000000"/>
-                </a:solidFill>
-                <a:latin typeface="Times New Roman"/>
-              </a:rPr>
-              <a:t>ve</a:t>
+              <a:t>Objective</a:t>
             </a:r>
             <a:endParaRPr b="0" lang="en-US" sz="4400" spc="-1" strike="noStrike">
               <a:latin typeface="Arial"/>
@@ -5813,7 +5945,7 @@
         <p:spPr>
           <a:xfrm>
             <a:off x="360000" y="1414440"/>
-            <a:ext cx="8225640" cy="5423400"/>
+            <a:ext cx="8224920" cy="5422680"/>
           </a:xfrm>
           <a:prstGeom prst="rect">
             <a:avLst/>
@@ -5824,7 +5956,7 @@
           </a:ln>
         </p:spPr>
         <p:txBody>
-          <a:bodyPr anchor="t">
+          <a:bodyPr lIns="0" rIns="0" tIns="0" bIns="0" anchor="t">
             <a:normAutofit/>
           </a:bodyPr>
           <a:p>
@@ -5999,7 +6131,7 @@
         <p:spPr>
           <a:xfrm>
             <a:off x="495360" y="76320"/>
-            <a:ext cx="8225640" cy="1139040"/>
+            <a:ext cx="8224920" cy="1138320"/>
           </a:xfrm>
           <a:prstGeom prst="rect">
             <a:avLst/>
@@ -6010,8 +6142,8 @@
           </a:ln>
         </p:spPr>
         <p:txBody>
-          <a:bodyPr anchor="ctr">
-            <a:normAutofit fontScale="95000"/>
+          <a:bodyPr lIns="0" rIns="0" tIns="0" bIns="0" anchor="ctr">
+            <a:normAutofit/>
           </a:bodyPr>
           <a:p>
             <a:pPr algn="ctr">
@@ -6857,7 +6989,7 @@
         <p:spPr>
           <a:xfrm>
             <a:off x="457200" y="274680"/>
-            <a:ext cx="8225640" cy="1139040"/>
+            <a:ext cx="8224920" cy="1138320"/>
           </a:xfrm>
           <a:prstGeom prst="rect">
             <a:avLst/>
@@ -6868,7 +7000,7 @@
           </a:ln>
         </p:spPr>
         <p:txBody>
-          <a:bodyPr anchor="ctr">
+          <a:bodyPr lIns="0" rIns="0" tIns="0" bIns="0" anchor="ctr">
             <a:noAutofit/>
           </a:bodyPr>
           <a:p>
@@ -6909,7 +7041,7 @@
         <p:spPr>
           <a:xfrm>
             <a:off x="360000" y="900000"/>
-            <a:ext cx="8225640" cy="5399280"/>
+            <a:ext cx="8224920" cy="5398560"/>
           </a:xfrm>
           <a:prstGeom prst="rect">
             <a:avLst/>
@@ -6920,8 +7052,8 @@
           </a:ln>
         </p:spPr>
         <p:txBody>
-          <a:bodyPr anchor="t">
-            <a:normAutofit fontScale="92000"/>
+          <a:bodyPr lIns="0" rIns="0" tIns="0" bIns="0" anchor="t">
+            <a:normAutofit fontScale="94000"/>
           </a:bodyPr>
           <a:p>
             <a:pPr marL="343080" algn="just">
@@ -7047,7 +7179,7 @@
         <p:spPr>
           <a:xfrm>
             <a:off x="457200" y="274680"/>
-            <a:ext cx="8225640" cy="1139040"/>
+            <a:ext cx="8224920" cy="1138320"/>
           </a:xfrm>
           <a:prstGeom prst="rect">
             <a:avLst/>
@@ -7058,7 +7190,7 @@
           </a:ln>
         </p:spPr>
         <p:txBody>
-          <a:bodyPr anchor="ctr">
+          <a:bodyPr lIns="0" rIns="0" tIns="0" bIns="0" anchor="ctr">
             <a:normAutofit/>
           </a:bodyPr>
           <a:p>
@@ -7099,7 +7231,7 @@
         <p:spPr>
           <a:xfrm>
             <a:off x="360000" y="1800000"/>
-            <a:ext cx="8225640" cy="4521960"/>
+            <a:ext cx="8224920" cy="4521240"/>
           </a:xfrm>
           <a:prstGeom prst="rect">
             <a:avLst/>
@@ -7110,7 +7242,7 @@
           </a:ln>
         </p:spPr>
         <p:txBody>
-          <a:bodyPr anchor="t">
+          <a:bodyPr lIns="0" rIns="0" tIns="0" bIns="0" anchor="t">
             <a:normAutofit/>
           </a:bodyPr>
           <a:p>
@@ -7286,7 +7418,7 @@
         <p:spPr>
           <a:xfrm>
             <a:off x="457200" y="274680"/>
-            <a:ext cx="8225640" cy="1139040"/>
+            <a:ext cx="8224920" cy="1138320"/>
           </a:xfrm>
           <a:prstGeom prst="rect">
             <a:avLst/>
@@ -7297,7 +7429,7 @@
           </a:ln>
         </p:spPr>
         <p:txBody>
-          <a:bodyPr anchor="ctr">
+          <a:bodyPr lIns="0" rIns="0" tIns="0" bIns="0" anchor="ctr">
             <a:noAutofit/>
           </a:bodyPr>
           <a:p>
@@ -7338,7 +7470,7 @@
         <p:spPr>
           <a:xfrm>
             <a:off x="180000" y="1440000"/>
-            <a:ext cx="5399640" cy="5219640"/>
+            <a:ext cx="5398920" cy="5218920"/>
           </a:xfrm>
           <a:prstGeom prst="rect">
             <a:avLst/>
@@ -7349,8 +7481,8 @@
           </a:ln>
         </p:spPr>
         <p:txBody>
-          <a:bodyPr anchor="t">
-            <a:normAutofit fontScale="92000"/>
+          <a:bodyPr lIns="0" rIns="0" tIns="0" bIns="0" anchor="t">
+            <a:normAutofit fontScale="93000"/>
           </a:bodyPr>
           <a:p>
             <a:pPr marL="343080" indent="-324000" algn="just">
@@ -7532,7 +7664,7 @@
         <p:spPr>
           <a:xfrm>
             <a:off x="5760000" y="1571400"/>
-            <a:ext cx="3272400" cy="2388240"/>
+            <a:ext cx="3271680" cy="2387520"/>
           </a:xfrm>
           <a:prstGeom prst="rect">
             <a:avLst/>
@@ -7555,7 +7687,7 @@
         <p:spPr>
           <a:xfrm>
             <a:off x="5760000" y="4027320"/>
-            <a:ext cx="3114360" cy="2272320"/>
+            <a:ext cx="3113640" cy="2271600"/>
           </a:xfrm>
           <a:prstGeom prst="rect">
             <a:avLst/>

</xml_diff>